<commit_message>
Updated Nav Pane Background & Overlay Guide Panel
</commit_message>
<xml_diff>
--- a/01-AdventureWorks DW/00-Assets/nav-pane-bg.pptx
+++ b/01-AdventureWorks DW/00-Assets/nav-pane-bg.pptx
@@ -117,7 +117,7 @@
 <file path=ppt/revisionInfo.xml><?xml version="1.0" encoding="utf-8"?>
 <p1510:revInfo xmlns:a="http://schemas.openxmlformats.org/drawingml/2006/main" xmlns:r="http://schemas.openxmlformats.org/officeDocument/2006/relationships" xmlns:p1510="http://schemas.microsoft.com/office/powerpoint/2015/10/main">
   <p1510:revLst>
-    <p1510:client id="{7386A042-6D13-4AB2-BFF8-DFDAD18EEA13}" v="31" dt="2021-09-25T08:30:44.260"/>
+    <p1510:client id="{73C8328D-B068-48EE-A3ED-7B0A2EC12C4F}" v="7" dt="2021-10-03T12:54:09.016"/>
   </p1510:revLst>
 </p1510:revInfo>
 </file>
@@ -562,6 +562,220 @@
       </pc:sldChg>
     </pc:docChg>
   </pc:docChgLst>
+  <pc:docChgLst>
+    <pc:chgData name="ii189@office19.win" userId="c90816fa-6938-41cb-bc24-c686b8227d8c" providerId="ADAL" clId="{73C8328D-B068-48EE-A3ED-7B0A2EC12C4F}"/>
+    <pc:docChg chg="custSel modSld">
+      <pc:chgData name="ii189@office19.win" userId="c90816fa-6938-41cb-bc24-c686b8227d8c" providerId="ADAL" clId="{73C8328D-B068-48EE-A3ED-7B0A2EC12C4F}" dt="2021-10-03T12:56:40.649" v="177" actId="14429"/>
+      <pc:docMkLst>
+        <pc:docMk/>
+      </pc:docMkLst>
+      <pc:sldChg chg="addSp modSp mod">
+        <pc:chgData name="ii189@office19.win" userId="c90816fa-6938-41cb-bc24-c686b8227d8c" providerId="ADAL" clId="{73C8328D-B068-48EE-A3ED-7B0A2EC12C4F}" dt="2021-10-03T12:50:36.766" v="29" actId="12788"/>
+        <pc:sldMkLst>
+          <pc:docMk/>
+          <pc:sldMk cId="1025118971" sldId="256"/>
+        </pc:sldMkLst>
+        <pc:spChg chg="mod">
+          <ac:chgData name="ii189@office19.win" userId="c90816fa-6938-41cb-bc24-c686b8227d8c" providerId="ADAL" clId="{73C8328D-B068-48EE-A3ED-7B0A2EC12C4F}" dt="2021-10-03T12:50:36.766" v="29" actId="12788"/>
+          <ac:spMkLst>
+            <pc:docMk/>
+            <pc:sldMk cId="1025118971" sldId="256"/>
+            <ac:spMk id="4" creationId="{2E021159-D717-4D81-8C59-2CD9B553B889}"/>
+          </ac:spMkLst>
+        </pc:spChg>
+        <pc:grpChg chg="mod ord">
+          <ac:chgData name="ii189@office19.win" userId="c90816fa-6938-41cb-bc24-c686b8227d8c" providerId="ADAL" clId="{73C8328D-B068-48EE-A3ED-7B0A2EC12C4F}" dt="2021-10-03T12:50:36.766" v="29" actId="12788"/>
+          <ac:grpSpMkLst>
+            <pc:docMk/>
+            <pc:sldMk cId="1025118971" sldId="256"/>
+            <ac:grpSpMk id="32" creationId="{7FFE219F-AC29-4FDE-AB9D-9F5EE23192FF}"/>
+          </ac:grpSpMkLst>
+        </pc:grpChg>
+        <pc:picChg chg="add mod">
+          <ac:chgData name="ii189@office19.win" userId="c90816fa-6938-41cb-bc24-c686b8227d8c" providerId="ADAL" clId="{73C8328D-B068-48EE-A3ED-7B0A2EC12C4F}" dt="2021-10-03T12:50:36.766" v="29" actId="12788"/>
+          <ac:picMkLst>
+            <pc:docMk/>
+            <pc:sldMk cId="1025118971" sldId="256"/>
+            <ac:picMk id="3" creationId="{03D4BDE9-6C7B-4DF3-A373-45FCF57EFE33}"/>
+          </ac:picMkLst>
+        </pc:picChg>
+        <pc:picChg chg="add mod">
+          <ac:chgData name="ii189@office19.win" userId="c90816fa-6938-41cb-bc24-c686b8227d8c" providerId="ADAL" clId="{73C8328D-B068-48EE-A3ED-7B0A2EC12C4F}" dt="2021-10-03T12:50:36.766" v="29" actId="12788"/>
+          <ac:picMkLst>
+            <pc:docMk/>
+            <pc:sldMk cId="1025118971" sldId="256"/>
+            <ac:picMk id="7" creationId="{1ECB0655-9F82-4E16-8146-DE04324D2F55}"/>
+          </ac:picMkLst>
+        </pc:picChg>
+      </pc:sldChg>
+      <pc:sldChg chg="addSp delSp modSp mod">
+        <pc:chgData name="ii189@office19.win" userId="c90816fa-6938-41cb-bc24-c686b8227d8c" providerId="ADAL" clId="{73C8328D-B068-48EE-A3ED-7B0A2EC12C4F}" dt="2021-10-03T12:55:30.532" v="175" actId="478"/>
+        <pc:sldMkLst>
+          <pc:docMk/>
+          <pc:sldMk cId="3931872639" sldId="257"/>
+        </pc:sldMkLst>
+        <pc:spChg chg="mod">
+          <ac:chgData name="ii189@office19.win" userId="c90816fa-6938-41cb-bc24-c686b8227d8c" providerId="ADAL" clId="{73C8328D-B068-48EE-A3ED-7B0A2EC12C4F}" dt="2021-10-03T12:52:09.743" v="40" actId="1076"/>
+          <ac:spMkLst>
+            <pc:docMk/>
+            <pc:sldMk cId="3931872639" sldId="257"/>
+            <ac:spMk id="8" creationId="{14D5A37D-C501-471C-A959-544DD95375C6}"/>
+          </ac:spMkLst>
+        </pc:spChg>
+        <pc:spChg chg="add mod">
+          <ac:chgData name="ii189@office19.win" userId="c90816fa-6938-41cb-bc24-c686b8227d8c" providerId="ADAL" clId="{73C8328D-B068-48EE-A3ED-7B0A2EC12C4F}" dt="2021-10-03T12:53:29.183" v="148" actId="14100"/>
+          <ac:spMkLst>
+            <pc:docMk/>
+            <pc:sldMk cId="3931872639" sldId="257"/>
+            <ac:spMk id="28" creationId="{BC116B72-381E-47D5-B61E-38E2EC22C4C7}"/>
+          </ac:spMkLst>
+        </pc:spChg>
+        <pc:spChg chg="add mod">
+          <ac:chgData name="ii189@office19.win" userId="c90816fa-6938-41cb-bc24-c686b8227d8c" providerId="ADAL" clId="{73C8328D-B068-48EE-A3ED-7B0A2EC12C4F}" dt="2021-10-03T12:52:56.999" v="95" actId="20577"/>
+          <ac:spMkLst>
+            <pc:docMk/>
+            <pc:sldMk cId="3931872639" sldId="257"/>
+            <ac:spMk id="29" creationId="{9F3A64D4-F2C2-425F-B6D8-492CA8EA8275}"/>
+          </ac:spMkLst>
+        </pc:spChg>
+        <pc:grpChg chg="add del mod">
+          <ac:chgData name="ii189@office19.win" userId="c90816fa-6938-41cb-bc24-c686b8227d8c" providerId="ADAL" clId="{73C8328D-B068-48EE-A3ED-7B0A2EC12C4F}" dt="2021-10-03T12:55:30.532" v="175" actId="478"/>
+          <ac:grpSpMkLst>
+            <pc:docMk/>
+            <pc:sldMk cId="3931872639" sldId="257"/>
+            <ac:grpSpMk id="13" creationId="{DEBFDB17-9187-455E-964F-276C643C2F2A}"/>
+          </ac:grpSpMkLst>
+        </pc:grpChg>
+        <pc:picChg chg="add del mod">
+          <ac:chgData name="ii189@office19.win" userId="c90816fa-6938-41cb-bc24-c686b8227d8c" providerId="ADAL" clId="{73C8328D-B068-48EE-A3ED-7B0A2EC12C4F}" dt="2021-10-03T12:55:29.349" v="174" actId="478"/>
+          <ac:picMkLst>
+            <pc:docMk/>
+            <pc:sldMk cId="3931872639" sldId="257"/>
+            <ac:picMk id="26" creationId="{C2A1C339-8711-4D96-AFE1-6AC3022C03D6}"/>
+          </ac:picMkLst>
+        </pc:picChg>
+        <pc:picChg chg="add del mod">
+          <ac:chgData name="ii189@office19.win" userId="c90816fa-6938-41cb-bc24-c686b8227d8c" providerId="ADAL" clId="{73C8328D-B068-48EE-A3ED-7B0A2EC12C4F}" dt="2021-10-03T12:55:28.045" v="173" actId="478"/>
+          <ac:picMkLst>
+            <pc:docMk/>
+            <pc:sldMk cId="3931872639" sldId="257"/>
+            <ac:picMk id="27" creationId="{C7F98C94-0F7A-45E5-B0DC-BB2104002475}"/>
+          </ac:picMkLst>
+        </pc:picChg>
+        <pc:cxnChg chg="mod">
+          <ac:chgData name="ii189@office19.win" userId="c90816fa-6938-41cb-bc24-c686b8227d8c" providerId="ADAL" clId="{73C8328D-B068-48EE-A3ED-7B0A2EC12C4F}" dt="2021-10-03T12:51:08.166" v="30"/>
+          <ac:cxnSpMkLst>
+            <pc:docMk/>
+            <pc:sldMk cId="3931872639" sldId="257"/>
+            <ac:cxnSpMk id="14" creationId="{458045AA-A95A-49A5-8CD2-8C874D0510B4}"/>
+          </ac:cxnSpMkLst>
+        </pc:cxnChg>
+        <pc:cxnChg chg="mod">
+          <ac:chgData name="ii189@office19.win" userId="c90816fa-6938-41cb-bc24-c686b8227d8c" providerId="ADAL" clId="{73C8328D-B068-48EE-A3ED-7B0A2EC12C4F}" dt="2021-10-03T12:51:08.166" v="30"/>
+          <ac:cxnSpMkLst>
+            <pc:docMk/>
+            <pc:sldMk cId="3931872639" sldId="257"/>
+            <ac:cxnSpMk id="18" creationId="{77588340-2FE5-47CF-B0FE-FF1FC75534AA}"/>
+          </ac:cxnSpMkLst>
+        </pc:cxnChg>
+        <pc:cxnChg chg="mod">
+          <ac:chgData name="ii189@office19.win" userId="c90816fa-6938-41cb-bc24-c686b8227d8c" providerId="ADAL" clId="{73C8328D-B068-48EE-A3ED-7B0A2EC12C4F}" dt="2021-10-03T12:51:08.166" v="30"/>
+          <ac:cxnSpMkLst>
+            <pc:docMk/>
+            <pc:sldMk cId="3931872639" sldId="257"/>
+            <ac:cxnSpMk id="25" creationId="{3588CA7E-95AA-444B-9862-6B8ED5755918}"/>
+          </ac:cxnSpMkLst>
+        </pc:cxnChg>
+      </pc:sldChg>
+      <pc:sldChg chg="addSp delSp modSp mod">
+        <pc:chgData name="ii189@office19.win" userId="c90816fa-6938-41cb-bc24-c686b8227d8c" providerId="ADAL" clId="{73C8328D-B068-48EE-A3ED-7B0A2EC12C4F}" dt="2021-10-03T12:56:40.649" v="177" actId="14429"/>
+        <pc:sldMkLst>
+          <pc:docMk/>
+          <pc:sldMk cId="2100109083" sldId="258"/>
+        </pc:sldMkLst>
+        <pc:spChg chg="mod modVis">
+          <ac:chgData name="ii189@office19.win" userId="c90816fa-6938-41cb-bc24-c686b8227d8c" providerId="ADAL" clId="{73C8328D-B068-48EE-A3ED-7B0A2EC12C4F}" dt="2021-10-03T12:56:40.649" v="177" actId="14429"/>
+          <ac:spMkLst>
+            <pc:docMk/>
+            <pc:sldMk cId="2100109083" sldId="258"/>
+            <ac:spMk id="6" creationId="{972C0003-F76D-488A-81D4-7A96817E3208}"/>
+          </ac:spMkLst>
+        </pc:spChg>
+        <pc:spChg chg="mod">
+          <ac:chgData name="ii189@office19.win" userId="c90816fa-6938-41cb-bc24-c686b8227d8c" providerId="ADAL" clId="{73C8328D-B068-48EE-A3ED-7B0A2EC12C4F}" dt="2021-10-03T12:54:01.992" v="155" actId="1076"/>
+          <ac:spMkLst>
+            <pc:docMk/>
+            <pc:sldMk cId="2100109083" sldId="258"/>
+            <ac:spMk id="8" creationId="{14D5A37D-C501-471C-A959-544DD95375C6}"/>
+          </ac:spMkLst>
+        </pc:spChg>
+        <pc:spChg chg="add mod">
+          <ac:chgData name="ii189@office19.win" userId="c90816fa-6938-41cb-bc24-c686b8227d8c" providerId="ADAL" clId="{73C8328D-B068-48EE-A3ED-7B0A2EC12C4F}" dt="2021-10-03T12:54:26.732" v="161" actId="14100"/>
+          <ac:spMkLst>
+            <pc:docMk/>
+            <pc:sldMk cId="2100109083" sldId="258"/>
+            <ac:spMk id="23" creationId="{A968C119-75C8-4FAC-B226-7F72D93F36F7}"/>
+          </ac:spMkLst>
+        </pc:spChg>
+        <pc:spChg chg="add mod">
+          <ac:chgData name="ii189@office19.win" userId="c90816fa-6938-41cb-bc24-c686b8227d8c" providerId="ADAL" clId="{73C8328D-B068-48EE-A3ED-7B0A2EC12C4F}" dt="2021-10-03T12:55:20.966" v="172" actId="14100"/>
+          <ac:spMkLst>
+            <pc:docMk/>
+            <pc:sldMk cId="2100109083" sldId="258"/>
+            <ac:spMk id="26" creationId="{C7E02353-95B4-49B0-A06D-23F551B1EB21}"/>
+          </ac:spMkLst>
+        </pc:spChg>
+        <pc:grpChg chg="add del mod">
+          <ac:chgData name="ii189@office19.win" userId="c90816fa-6938-41cb-bc24-c686b8227d8c" providerId="ADAL" clId="{73C8328D-B068-48EE-A3ED-7B0A2EC12C4F}" dt="2021-10-03T12:55:02.316" v="166" actId="478"/>
+          <ac:grpSpMkLst>
+            <pc:docMk/>
+            <pc:sldMk cId="2100109083" sldId="258"/>
+            <ac:grpSpMk id="13" creationId="{A64F93BA-9897-4C39-884C-F184C9596CE4}"/>
+          </ac:grpSpMkLst>
+        </pc:grpChg>
+        <pc:picChg chg="add del mod">
+          <ac:chgData name="ii189@office19.win" userId="c90816fa-6938-41cb-bc24-c686b8227d8c" providerId="ADAL" clId="{73C8328D-B068-48EE-A3ED-7B0A2EC12C4F}" dt="2021-10-03T12:55:01.236" v="165" actId="478"/>
+          <ac:picMkLst>
+            <pc:docMk/>
+            <pc:sldMk cId="2100109083" sldId="258"/>
+            <ac:picMk id="20" creationId="{4007E952-ECB1-42FD-A434-B8AA6AEE62DD}"/>
+          </ac:picMkLst>
+        </pc:picChg>
+        <pc:picChg chg="add del mod">
+          <ac:chgData name="ii189@office19.win" userId="c90816fa-6938-41cb-bc24-c686b8227d8c" providerId="ADAL" clId="{73C8328D-B068-48EE-A3ED-7B0A2EC12C4F}" dt="2021-10-03T12:54:58.236" v="164" actId="478"/>
+          <ac:picMkLst>
+            <pc:docMk/>
+            <pc:sldMk cId="2100109083" sldId="258"/>
+            <ac:picMk id="21" creationId="{F0731FBC-F25C-482A-9766-DA57BC3B35F5}"/>
+          </ac:picMkLst>
+        </pc:picChg>
+        <pc:cxnChg chg="mod">
+          <ac:chgData name="ii189@office19.win" userId="c90816fa-6938-41cb-bc24-c686b8227d8c" providerId="ADAL" clId="{73C8328D-B068-48EE-A3ED-7B0A2EC12C4F}" dt="2021-10-03T12:51:33.066" v="33"/>
+          <ac:cxnSpMkLst>
+            <pc:docMk/>
+            <pc:sldMk cId="2100109083" sldId="258"/>
+            <ac:cxnSpMk id="14" creationId="{958A7340-5AF2-477E-9D47-D7EDEE7C138B}"/>
+          </ac:cxnSpMkLst>
+        </pc:cxnChg>
+        <pc:cxnChg chg="mod">
+          <ac:chgData name="ii189@office19.win" userId="c90816fa-6938-41cb-bc24-c686b8227d8c" providerId="ADAL" clId="{73C8328D-B068-48EE-A3ED-7B0A2EC12C4F}" dt="2021-10-03T12:51:33.066" v="33"/>
+          <ac:cxnSpMkLst>
+            <pc:docMk/>
+            <pc:sldMk cId="2100109083" sldId="258"/>
+            <ac:cxnSpMk id="18" creationId="{FC23D310-AB67-4791-97FA-13C8B7D9DCB9}"/>
+          </ac:cxnSpMkLst>
+        </pc:cxnChg>
+        <pc:cxnChg chg="mod">
+          <ac:chgData name="ii189@office19.win" userId="c90816fa-6938-41cb-bc24-c686b8227d8c" providerId="ADAL" clId="{73C8328D-B068-48EE-A3ED-7B0A2EC12C4F}" dt="2021-10-03T12:51:33.066" v="33"/>
+          <ac:cxnSpMkLst>
+            <pc:docMk/>
+            <pc:sldMk cId="2100109083" sldId="258"/>
+            <ac:cxnSpMk id="19" creationId="{EC0BDB83-8BD4-447C-A137-115252CE39C9}"/>
+          </ac:cxnSpMkLst>
+        </pc:cxnChg>
+      </pc:sldChg>
+    </pc:docChg>
+  </pc:docChgLst>
 </pc:chgInfo>
 </file>
 
@@ -712,7 +926,7 @@
           <a:p>
             <a:fld id="{4AAEB156-C597-4A3E-9994-23AA56E1122A}" type="datetimeFigureOut">
               <a:rPr lang="en-US" smtClean="0"/>
-              <a:t>9/25/2021</a:t>
+              <a:t>10/3/2021</a:t>
             </a:fld>
             <a:endParaRPr lang="en-US"/>
           </a:p>
@@ -910,7 +1124,7 @@
           <a:p>
             <a:fld id="{4AAEB156-C597-4A3E-9994-23AA56E1122A}" type="datetimeFigureOut">
               <a:rPr lang="en-US" smtClean="0"/>
-              <a:t>9/25/2021</a:t>
+              <a:t>10/3/2021</a:t>
             </a:fld>
             <a:endParaRPr lang="en-US"/>
           </a:p>
@@ -1118,7 +1332,7 @@
           <a:p>
             <a:fld id="{4AAEB156-C597-4A3E-9994-23AA56E1122A}" type="datetimeFigureOut">
               <a:rPr lang="en-US" smtClean="0"/>
-              <a:t>9/25/2021</a:t>
+              <a:t>10/3/2021</a:t>
             </a:fld>
             <a:endParaRPr lang="en-US"/>
           </a:p>
@@ -1316,7 +1530,7 @@
           <a:p>
             <a:fld id="{4AAEB156-C597-4A3E-9994-23AA56E1122A}" type="datetimeFigureOut">
               <a:rPr lang="en-US" smtClean="0"/>
-              <a:t>9/25/2021</a:t>
+              <a:t>10/3/2021</a:t>
             </a:fld>
             <a:endParaRPr lang="en-US"/>
           </a:p>
@@ -1591,7 +1805,7 @@
           <a:p>
             <a:fld id="{4AAEB156-C597-4A3E-9994-23AA56E1122A}" type="datetimeFigureOut">
               <a:rPr lang="en-US" smtClean="0"/>
-              <a:t>9/25/2021</a:t>
+              <a:t>10/3/2021</a:t>
             </a:fld>
             <a:endParaRPr lang="en-US"/>
           </a:p>
@@ -1856,7 +2070,7 @@
           <a:p>
             <a:fld id="{4AAEB156-C597-4A3E-9994-23AA56E1122A}" type="datetimeFigureOut">
               <a:rPr lang="en-US" smtClean="0"/>
-              <a:t>9/25/2021</a:t>
+              <a:t>10/3/2021</a:t>
             </a:fld>
             <a:endParaRPr lang="en-US"/>
           </a:p>
@@ -2268,7 +2482,7 @@
           <a:p>
             <a:fld id="{4AAEB156-C597-4A3E-9994-23AA56E1122A}" type="datetimeFigureOut">
               <a:rPr lang="en-US" smtClean="0"/>
-              <a:t>9/25/2021</a:t>
+              <a:t>10/3/2021</a:t>
             </a:fld>
             <a:endParaRPr lang="en-US"/>
           </a:p>
@@ -2409,7 +2623,7 @@
           <a:p>
             <a:fld id="{4AAEB156-C597-4A3E-9994-23AA56E1122A}" type="datetimeFigureOut">
               <a:rPr lang="en-US" smtClean="0"/>
-              <a:t>9/25/2021</a:t>
+              <a:t>10/3/2021</a:t>
             </a:fld>
             <a:endParaRPr lang="en-US"/>
           </a:p>
@@ -2522,7 +2736,7 @@
           <a:p>
             <a:fld id="{4AAEB156-C597-4A3E-9994-23AA56E1122A}" type="datetimeFigureOut">
               <a:rPr lang="en-US" smtClean="0"/>
-              <a:t>9/25/2021</a:t>
+              <a:t>10/3/2021</a:t>
             </a:fld>
             <a:endParaRPr lang="en-US"/>
           </a:p>
@@ -2833,7 +3047,7 @@
           <a:p>
             <a:fld id="{4AAEB156-C597-4A3E-9994-23AA56E1122A}" type="datetimeFigureOut">
               <a:rPr lang="en-US" smtClean="0"/>
-              <a:t>9/25/2021</a:t>
+              <a:t>10/3/2021</a:t>
             </a:fld>
             <a:endParaRPr lang="en-US"/>
           </a:p>
@@ -3121,7 +3335,7 @@
           <a:p>
             <a:fld id="{4AAEB156-C597-4A3E-9994-23AA56E1122A}" type="datetimeFigureOut">
               <a:rPr lang="en-US" smtClean="0"/>
-              <a:t>9/25/2021</a:t>
+              <a:t>10/3/2021</a:t>
             </a:fld>
             <a:endParaRPr lang="en-US"/>
           </a:p>
@@ -3362,7 +3576,7 @@
           <a:p>
             <a:fld id="{4AAEB156-C597-4A3E-9994-23AA56E1122A}" type="datetimeFigureOut">
               <a:rPr lang="en-US" smtClean="0"/>
-              <a:t>9/25/2021</a:t>
+              <a:t>10/3/2021</a:t>
             </a:fld>
             <a:endParaRPr lang="en-US"/>
           </a:p>
@@ -3940,156 +4154,6 @@
           </a:p>
         </p:txBody>
       </p:sp>
-      <p:grpSp>
-        <p:nvGrpSpPr>
-          <p:cNvPr id="32" name="Group 31">
-            <a:extLst>
-              <a:ext uri="{FF2B5EF4-FFF2-40B4-BE49-F238E27FC236}">
-                <a16:creationId xmlns:a16="http://schemas.microsoft.com/office/drawing/2014/main" id="{7FFE219F-AC29-4FDE-AB9D-9F5EE23192FF}"/>
-              </a:ext>
-            </a:extLst>
-          </p:cNvPr>
-          <p:cNvGrpSpPr/>
-          <p:nvPr/>
-        </p:nvGrpSpPr>
-        <p:grpSpPr>
-          <a:xfrm>
-            <a:off x="135948" y="190832"/>
-            <a:ext cx="166978" cy="121920"/>
-            <a:chOff x="119014" y="190832"/>
-            <a:chExt cx="166978" cy="121920"/>
-          </a:xfrm>
-        </p:grpSpPr>
-        <p:cxnSp>
-          <p:nvCxnSpPr>
-            <p:cNvPr id="28" name="Straight Connector 27">
-              <a:extLst>
-                <a:ext uri="{FF2B5EF4-FFF2-40B4-BE49-F238E27FC236}">
-                  <a16:creationId xmlns:a16="http://schemas.microsoft.com/office/drawing/2014/main" id="{F632D563-7A3A-4B06-8825-8B32A5E7D7D4}"/>
-                </a:ext>
-              </a:extLst>
-            </p:cNvPr>
-            <p:cNvCxnSpPr>
-              <a:cxnSpLocks/>
-            </p:cNvCxnSpPr>
-            <p:nvPr/>
-          </p:nvCxnSpPr>
-          <p:spPr>
-            <a:xfrm>
-              <a:off x="119014" y="190832"/>
-              <a:ext cx="166978" cy="0"/>
-            </a:xfrm>
-            <a:prstGeom prst="line">
-              <a:avLst/>
-            </a:prstGeom>
-            <a:ln w="19050">
-              <a:solidFill>
-                <a:schemeClr val="bg1"/>
-              </a:solidFill>
-            </a:ln>
-          </p:spPr>
-          <p:style>
-            <a:lnRef idx="1">
-              <a:schemeClr val="accent1"/>
-            </a:lnRef>
-            <a:fillRef idx="0">
-              <a:schemeClr val="accent1"/>
-            </a:fillRef>
-            <a:effectRef idx="0">
-              <a:schemeClr val="accent1"/>
-            </a:effectRef>
-            <a:fontRef idx="minor">
-              <a:schemeClr val="tx1"/>
-            </a:fontRef>
-          </p:style>
-        </p:cxnSp>
-        <p:cxnSp>
-          <p:nvCxnSpPr>
-            <p:cNvPr id="30" name="Straight Connector 29">
-              <a:extLst>
-                <a:ext uri="{FF2B5EF4-FFF2-40B4-BE49-F238E27FC236}">
-                  <a16:creationId xmlns:a16="http://schemas.microsoft.com/office/drawing/2014/main" id="{1B350E54-24F4-4BFF-9465-C74265722BCF}"/>
-                </a:ext>
-              </a:extLst>
-            </p:cNvPr>
-            <p:cNvCxnSpPr>
-              <a:cxnSpLocks/>
-            </p:cNvCxnSpPr>
-            <p:nvPr/>
-          </p:nvCxnSpPr>
-          <p:spPr>
-            <a:xfrm>
-              <a:off x="119014" y="251792"/>
-              <a:ext cx="166978" cy="0"/>
-            </a:xfrm>
-            <a:prstGeom prst="line">
-              <a:avLst/>
-            </a:prstGeom>
-            <a:ln w="19050">
-              <a:solidFill>
-                <a:schemeClr val="bg1"/>
-              </a:solidFill>
-            </a:ln>
-          </p:spPr>
-          <p:style>
-            <a:lnRef idx="1">
-              <a:schemeClr val="accent1"/>
-            </a:lnRef>
-            <a:fillRef idx="0">
-              <a:schemeClr val="accent1"/>
-            </a:fillRef>
-            <a:effectRef idx="0">
-              <a:schemeClr val="accent1"/>
-            </a:effectRef>
-            <a:fontRef idx="minor">
-              <a:schemeClr val="tx1"/>
-            </a:fontRef>
-          </p:style>
-        </p:cxnSp>
-        <p:cxnSp>
-          <p:nvCxnSpPr>
-            <p:cNvPr id="31" name="Straight Connector 30">
-              <a:extLst>
-                <a:ext uri="{FF2B5EF4-FFF2-40B4-BE49-F238E27FC236}">
-                  <a16:creationId xmlns:a16="http://schemas.microsoft.com/office/drawing/2014/main" id="{A93593EA-3F62-42B8-B30C-D86C1875F1B3}"/>
-                </a:ext>
-              </a:extLst>
-            </p:cNvPr>
-            <p:cNvCxnSpPr>
-              <a:cxnSpLocks/>
-            </p:cNvCxnSpPr>
-            <p:nvPr/>
-          </p:nvCxnSpPr>
-          <p:spPr>
-            <a:xfrm>
-              <a:off x="119014" y="312752"/>
-              <a:ext cx="166978" cy="0"/>
-            </a:xfrm>
-            <a:prstGeom prst="line">
-              <a:avLst/>
-            </a:prstGeom>
-            <a:ln w="19050">
-              <a:solidFill>
-                <a:schemeClr val="bg1"/>
-              </a:solidFill>
-            </a:ln>
-          </p:spPr>
-          <p:style>
-            <a:lnRef idx="1">
-              <a:schemeClr val="accent1"/>
-            </a:lnRef>
-            <a:fillRef idx="0">
-              <a:schemeClr val="accent1"/>
-            </a:fillRef>
-            <a:effectRef idx="0">
-              <a:schemeClr val="accent1"/>
-            </a:effectRef>
-            <a:fontRef idx="minor">
-              <a:schemeClr val="tx1"/>
-            </a:fontRef>
-          </p:style>
-        </p:cxnSp>
-      </p:grpSp>
       <p:grpSp>
         <p:nvGrpSpPr>
           <p:cNvPr id="21" name="Graphic 2" descr="Information outline">
@@ -5213,6 +5277,234 @@
           </a:p>
         </p:txBody>
       </p:sp>
+      <p:grpSp>
+        <p:nvGrpSpPr>
+          <p:cNvPr id="32" name="Group 31">
+            <a:extLst>
+              <a:ext uri="{FF2B5EF4-FFF2-40B4-BE49-F238E27FC236}">
+                <a16:creationId xmlns:a16="http://schemas.microsoft.com/office/drawing/2014/main" id="{7FFE219F-AC29-4FDE-AB9D-9F5EE23192FF}"/>
+              </a:ext>
+            </a:extLst>
+          </p:cNvPr>
+          <p:cNvGrpSpPr/>
+          <p:nvPr/>
+        </p:nvGrpSpPr>
+        <p:grpSpPr>
+          <a:xfrm>
+            <a:off x="130695" y="190832"/>
+            <a:ext cx="166978" cy="121920"/>
+            <a:chOff x="119014" y="190832"/>
+            <a:chExt cx="166978" cy="121920"/>
+          </a:xfrm>
+        </p:grpSpPr>
+        <p:cxnSp>
+          <p:nvCxnSpPr>
+            <p:cNvPr id="28" name="Straight Connector 27">
+              <a:extLst>
+                <a:ext uri="{FF2B5EF4-FFF2-40B4-BE49-F238E27FC236}">
+                  <a16:creationId xmlns:a16="http://schemas.microsoft.com/office/drawing/2014/main" id="{F632D563-7A3A-4B06-8825-8B32A5E7D7D4}"/>
+                </a:ext>
+              </a:extLst>
+            </p:cNvPr>
+            <p:cNvCxnSpPr>
+              <a:cxnSpLocks/>
+            </p:cNvCxnSpPr>
+            <p:nvPr/>
+          </p:nvCxnSpPr>
+          <p:spPr>
+            <a:xfrm>
+              <a:off x="119014" y="190832"/>
+              <a:ext cx="166978" cy="0"/>
+            </a:xfrm>
+            <a:prstGeom prst="line">
+              <a:avLst/>
+            </a:prstGeom>
+            <a:ln w="19050">
+              <a:solidFill>
+                <a:schemeClr val="bg1"/>
+              </a:solidFill>
+            </a:ln>
+          </p:spPr>
+          <p:style>
+            <a:lnRef idx="1">
+              <a:schemeClr val="accent1"/>
+            </a:lnRef>
+            <a:fillRef idx="0">
+              <a:schemeClr val="accent1"/>
+            </a:fillRef>
+            <a:effectRef idx="0">
+              <a:schemeClr val="accent1"/>
+            </a:effectRef>
+            <a:fontRef idx="minor">
+              <a:schemeClr val="tx1"/>
+            </a:fontRef>
+          </p:style>
+        </p:cxnSp>
+        <p:cxnSp>
+          <p:nvCxnSpPr>
+            <p:cNvPr id="30" name="Straight Connector 29">
+              <a:extLst>
+                <a:ext uri="{FF2B5EF4-FFF2-40B4-BE49-F238E27FC236}">
+                  <a16:creationId xmlns:a16="http://schemas.microsoft.com/office/drawing/2014/main" id="{1B350E54-24F4-4BFF-9465-C74265722BCF}"/>
+                </a:ext>
+              </a:extLst>
+            </p:cNvPr>
+            <p:cNvCxnSpPr>
+              <a:cxnSpLocks/>
+            </p:cNvCxnSpPr>
+            <p:nvPr/>
+          </p:nvCxnSpPr>
+          <p:spPr>
+            <a:xfrm>
+              <a:off x="119014" y="251792"/>
+              <a:ext cx="166978" cy="0"/>
+            </a:xfrm>
+            <a:prstGeom prst="line">
+              <a:avLst/>
+            </a:prstGeom>
+            <a:ln w="19050">
+              <a:solidFill>
+                <a:schemeClr val="bg1"/>
+              </a:solidFill>
+            </a:ln>
+          </p:spPr>
+          <p:style>
+            <a:lnRef idx="1">
+              <a:schemeClr val="accent1"/>
+            </a:lnRef>
+            <a:fillRef idx="0">
+              <a:schemeClr val="accent1"/>
+            </a:fillRef>
+            <a:effectRef idx="0">
+              <a:schemeClr val="accent1"/>
+            </a:effectRef>
+            <a:fontRef idx="minor">
+              <a:schemeClr val="tx1"/>
+            </a:fontRef>
+          </p:style>
+        </p:cxnSp>
+        <p:cxnSp>
+          <p:nvCxnSpPr>
+            <p:cNvPr id="31" name="Straight Connector 30">
+              <a:extLst>
+                <a:ext uri="{FF2B5EF4-FFF2-40B4-BE49-F238E27FC236}">
+                  <a16:creationId xmlns:a16="http://schemas.microsoft.com/office/drawing/2014/main" id="{A93593EA-3F62-42B8-B30C-D86C1875F1B3}"/>
+                </a:ext>
+              </a:extLst>
+            </p:cNvPr>
+            <p:cNvCxnSpPr>
+              <a:cxnSpLocks/>
+            </p:cNvCxnSpPr>
+            <p:nvPr/>
+          </p:nvCxnSpPr>
+          <p:spPr>
+            <a:xfrm>
+              <a:off x="119014" y="312752"/>
+              <a:ext cx="166978" cy="0"/>
+            </a:xfrm>
+            <a:prstGeom prst="line">
+              <a:avLst/>
+            </a:prstGeom>
+            <a:ln w="19050">
+              <a:solidFill>
+                <a:schemeClr val="bg1"/>
+              </a:solidFill>
+            </a:ln>
+          </p:spPr>
+          <p:style>
+            <a:lnRef idx="1">
+              <a:schemeClr val="accent1"/>
+            </a:lnRef>
+            <a:fillRef idx="0">
+              <a:schemeClr val="accent1"/>
+            </a:fillRef>
+            <a:effectRef idx="0">
+              <a:schemeClr val="accent1"/>
+            </a:effectRef>
+            <a:fontRef idx="minor">
+              <a:schemeClr val="tx1"/>
+            </a:fontRef>
+          </p:style>
+        </p:cxnSp>
+      </p:grpSp>
+      <p:pic>
+        <p:nvPicPr>
+          <p:cNvPr id="3" name="Graphic 2" descr="Filter with solid fill">
+            <a:extLst>
+              <a:ext uri="{FF2B5EF4-FFF2-40B4-BE49-F238E27FC236}">
+                <a16:creationId xmlns:a16="http://schemas.microsoft.com/office/drawing/2014/main" id="{03D4BDE9-6C7B-4DF3-A373-45FCF57EFE33}"/>
+              </a:ext>
+            </a:extLst>
+          </p:cNvPr>
+          <p:cNvPicPr>
+            <a:picLocks noChangeAspect="1"/>
+          </p:cNvPicPr>
+          <p:nvPr/>
+        </p:nvPicPr>
+        <p:blipFill>
+          <a:blip r:embed="rId2">
+            <a:extLst>
+              <a:ext uri="{28A0092B-C50C-407E-A947-70E740481C1C}">
+                <a14:useLocalDpi xmlns:a14="http://schemas.microsoft.com/office/drawing/2010/main" val="0"/>
+              </a:ext>
+              <a:ext uri="{96DAC541-7B7A-43D3-8B79-37D633B846F1}">
+                <asvg:svgBlip xmlns:asvg="http://schemas.microsoft.com/office/drawing/2016/SVG/main" r:embed="rId3"/>
+              </a:ext>
+            </a:extLst>
+          </a:blip>
+          <a:stretch>
+            <a:fillRect/>
+          </a:stretch>
+        </p:blipFill>
+        <p:spPr>
+          <a:xfrm>
+            <a:off x="31304" y="479955"/>
+            <a:ext cx="365760" cy="365760"/>
+          </a:xfrm>
+          <a:prstGeom prst="rect">
+            <a:avLst/>
+          </a:prstGeom>
+        </p:spPr>
+      </p:pic>
+      <p:pic>
+        <p:nvPicPr>
+          <p:cNvPr id="7" name="Graphic 6" descr="Filter outline">
+            <a:extLst>
+              <a:ext uri="{FF2B5EF4-FFF2-40B4-BE49-F238E27FC236}">
+                <a16:creationId xmlns:a16="http://schemas.microsoft.com/office/drawing/2014/main" id="{1ECB0655-9F82-4E16-8146-DE04324D2F55}"/>
+              </a:ext>
+            </a:extLst>
+          </p:cNvPr>
+          <p:cNvPicPr>
+            <a:picLocks noChangeAspect="1"/>
+          </p:cNvPicPr>
+          <p:nvPr/>
+        </p:nvPicPr>
+        <p:blipFill>
+          <a:blip r:embed="rId4">
+            <a:extLst>
+              <a:ext uri="{28A0092B-C50C-407E-A947-70E740481C1C}">
+                <a14:useLocalDpi xmlns:a14="http://schemas.microsoft.com/office/drawing/2010/main" val="0"/>
+              </a:ext>
+              <a:ext uri="{96DAC541-7B7A-43D3-8B79-37D633B846F1}">
+                <asvg:svgBlip xmlns:asvg="http://schemas.microsoft.com/office/drawing/2016/SVG/main" r:embed="rId5"/>
+              </a:ext>
+            </a:extLst>
+          </a:blip>
+          <a:stretch>
+            <a:fillRect/>
+          </a:stretch>
+        </p:blipFill>
+        <p:spPr>
+          <a:xfrm>
+            <a:off x="31304" y="1012918"/>
+            <a:ext cx="365760" cy="365760"/>
+          </a:xfrm>
+          <a:prstGeom prst="rect">
+            <a:avLst/>
+          </a:prstGeom>
+        </p:spPr>
+      </p:pic>
     </p:spTree>
     <p:extLst>
       <p:ext uri="{BB962C8B-B14F-4D97-AF65-F5344CB8AC3E}">
@@ -5311,13 +5603,13 @@
         </p:nvSpPr>
         <p:spPr>
           <a:xfrm>
-            <a:off x="641517" y="444832"/>
-            <a:ext cx="1377784" cy="698168"/>
+            <a:off x="564515" y="662835"/>
+            <a:ext cx="3016084" cy="281889"/>
           </a:xfrm>
           <a:prstGeom prst="wedgeRoundRectCallout">
             <a:avLst>
-              <a:gd name="adj1" fmla="val -70014"/>
-              <a:gd name="adj2" fmla="val -79491"/>
+              <a:gd name="adj1" fmla="val -55781"/>
+              <a:gd name="adj2" fmla="val -45345"/>
               <a:gd name="adj3" fmla="val 16667"/>
             </a:avLst>
           </a:prstGeom>
@@ -6027,42 +6319,12 @@
           </a:p>
         </p:txBody>
       </p:sp>
-    </p:spTree>
-    <p:extLst>
-      <p:ext uri="{BB962C8B-B14F-4D97-AF65-F5344CB8AC3E}">
-        <p14:creationId xmlns:p14="http://schemas.microsoft.com/office/powerpoint/2010/main" val="3931872639"/>
-      </p:ext>
-    </p:extLst>
-  </p:cSld>
-  <p:clrMapOvr>
-    <a:masterClrMapping/>
-  </p:clrMapOvr>
-</p:sld>
-</file>
-
-<file path=ppt/slides/slide3.xml><?xml version="1.0" encoding="utf-8"?>
-<p:sld xmlns:a="http://schemas.openxmlformats.org/drawingml/2006/main" xmlns:r="http://schemas.openxmlformats.org/officeDocument/2006/relationships" xmlns:p="http://schemas.openxmlformats.org/presentationml/2006/main">
-  <p:cSld>
-    <p:spTree>
-      <p:nvGrpSpPr>
-        <p:cNvPr id="1" name=""/>
-        <p:cNvGrpSpPr/>
-        <p:nvPr/>
-      </p:nvGrpSpPr>
-      <p:grpSpPr>
-        <a:xfrm>
-          <a:off x="0" y="0"/>
-          <a:ext cx="0" cy="0"/>
-          <a:chOff x="0" y="0"/>
-          <a:chExt cx="0" cy="0"/>
-        </a:xfrm>
-      </p:grpSpPr>
-      <p:sp>
-        <p:nvSpPr>
-          <p:cNvPr id="6" name="Rectangle 5">
-            <a:extLst>
-              <a:ext uri="{FF2B5EF4-FFF2-40B4-BE49-F238E27FC236}">
-                <a16:creationId xmlns:a16="http://schemas.microsoft.com/office/drawing/2014/main" id="{972C0003-F76D-488A-81D4-7A96817E3208}"/>
+      <p:sp>
+        <p:nvSpPr>
+          <p:cNvPr id="28" name="Speech Bubble: Rectangle with Corners Rounded 27">
+            <a:extLst>
+              <a:ext uri="{FF2B5EF4-FFF2-40B4-BE49-F238E27FC236}">
+                <a16:creationId xmlns:a16="http://schemas.microsoft.com/office/drawing/2014/main" id="{BC116B72-381E-47D5-B61E-38E2EC22C4C7}"/>
               </a:ext>
             </a:extLst>
           </p:cNvPr>
@@ -6071,69 +6333,14 @@
         </p:nvSpPr>
         <p:spPr>
           <a:xfrm>
-            <a:off x="0" y="0"/>
-            <a:ext cx="12192000" cy="6858000"/>
+            <a:off x="649538" y="1193724"/>
+            <a:ext cx="3489326" cy="281889"/>
           </a:xfrm>
-          <a:prstGeom prst="rect">
-            <a:avLst/>
-          </a:prstGeom>
-          <a:solidFill>
-            <a:schemeClr val="bg1">
-              <a:alpha val="20000"/>
-            </a:schemeClr>
-          </a:solidFill>
-          <a:ln>
-            <a:noFill/>
-          </a:ln>
-        </p:spPr>
-        <p:style>
-          <a:lnRef idx="2">
-            <a:schemeClr val="accent1">
-              <a:shade val="50000"/>
-            </a:schemeClr>
-          </a:lnRef>
-          <a:fillRef idx="1">
-            <a:schemeClr val="accent1"/>
-          </a:fillRef>
-          <a:effectRef idx="0">
-            <a:schemeClr val="accent1"/>
-          </a:effectRef>
-          <a:fontRef idx="minor">
-            <a:schemeClr val="lt1"/>
-          </a:fontRef>
-        </p:style>
-        <p:txBody>
-          <a:bodyPr rtlCol="0" anchor="ctr"/>
-          <a:lstStyle/>
-          <a:p>
-            <a:pPr algn="ctr"/>
-            <a:endParaRPr lang="en-US"/>
-          </a:p>
-        </p:txBody>
-      </p:sp>
-      <p:sp>
-        <p:nvSpPr>
-          <p:cNvPr id="8" name="Callout: Left Arrow 7">
-            <a:extLst>
-              <a:ext uri="{FF2B5EF4-FFF2-40B4-BE49-F238E27FC236}">
-                <a16:creationId xmlns:a16="http://schemas.microsoft.com/office/drawing/2014/main" id="{14D5A37D-C501-471C-A959-544DD95375C6}"/>
-              </a:ext>
-            </a:extLst>
-          </p:cNvPr>
-          <p:cNvSpPr/>
-          <p:nvPr/>
-        </p:nvSpPr>
-        <p:spPr>
-          <a:xfrm>
-            <a:off x="374427" y="56888"/>
-            <a:ext cx="2038573" cy="469998"/>
-          </a:xfrm>
-          <a:prstGeom prst="leftArrowCallout">
+          <a:prstGeom prst="wedgeRoundRectCallout">
             <a:avLst>
-              <a:gd name="adj1" fmla="val 25000"/>
-              <a:gd name="adj2" fmla="val 25000"/>
-              <a:gd name="adj3" fmla="val 25000"/>
-              <a:gd name="adj4" fmla="val 86451"/>
+              <a:gd name="adj1" fmla="val -55781"/>
+              <a:gd name="adj2" fmla="val -45345"/>
+              <a:gd name="adj3" fmla="val 16667"/>
             </a:avLst>
           </a:prstGeom>
           <a:solidFill>
@@ -6180,7 +6387,238 @@
                 </a:solidFill>
                 <a:latin typeface="Trebuchet MS" panose="020B0603020202020204" pitchFamily="34" charset="0"/>
               </a:rPr>
-              <a:t>Click here for more filter options.</a:t>
+              <a:t>Click here to reset all filters from page.</a:t>
+            </a:r>
+          </a:p>
+        </p:txBody>
+      </p:sp>
+      <p:sp>
+        <p:nvSpPr>
+          <p:cNvPr id="29" name="Speech Bubble: Rectangle with Corners Rounded 28">
+            <a:extLst>
+              <a:ext uri="{FF2B5EF4-FFF2-40B4-BE49-F238E27FC236}">
+                <a16:creationId xmlns:a16="http://schemas.microsoft.com/office/drawing/2014/main" id="{9F3A64D4-F2C2-425F-B6D8-492CA8EA8275}"/>
+              </a:ext>
+            </a:extLst>
+          </p:cNvPr>
+          <p:cNvSpPr/>
+          <p:nvPr/>
+        </p:nvSpPr>
+        <p:spPr>
+          <a:xfrm>
+            <a:off x="649538" y="230318"/>
+            <a:ext cx="3016084" cy="281889"/>
+          </a:xfrm>
+          <a:prstGeom prst="wedgeRoundRectCallout">
+            <a:avLst>
+              <a:gd name="adj1" fmla="val -55781"/>
+              <a:gd name="adj2" fmla="val -45345"/>
+              <a:gd name="adj3" fmla="val 16667"/>
+            </a:avLst>
+          </a:prstGeom>
+          <a:solidFill>
+            <a:schemeClr val="bg1"/>
+          </a:solidFill>
+          <a:ln>
+            <a:solidFill>
+              <a:schemeClr val="tx1"/>
+            </a:solidFill>
+          </a:ln>
+          <a:effectLst>
+            <a:outerShdw blurRad="50800" dist="38100" dir="2700000" algn="tl" rotWithShape="0">
+              <a:prstClr val="black">
+                <a:alpha val="40000"/>
+              </a:prstClr>
+            </a:outerShdw>
+          </a:effectLst>
+        </p:spPr>
+        <p:style>
+          <a:lnRef idx="2">
+            <a:schemeClr val="accent1">
+              <a:shade val="50000"/>
+            </a:schemeClr>
+          </a:lnRef>
+          <a:fillRef idx="1">
+            <a:schemeClr val="accent1"/>
+          </a:fillRef>
+          <a:effectRef idx="0">
+            <a:schemeClr val="accent1"/>
+          </a:effectRef>
+          <a:fontRef idx="minor">
+            <a:schemeClr val="lt1"/>
+          </a:fontRef>
+        </p:style>
+        <p:txBody>
+          <a:bodyPr rtlCol="0" anchor="ctr"/>
+          <a:lstStyle/>
+          <a:p>
+            <a:pPr algn="ctr"/>
+            <a:r>
+              <a:rPr lang="en-US" sz="1400" dirty="0">
+                <a:solidFill>
+                  <a:schemeClr val="tx1"/>
+                </a:solidFill>
+                <a:latin typeface="Trebuchet MS" panose="020B0603020202020204" pitchFamily="34" charset="0"/>
+              </a:rPr>
+              <a:t>Click here for navigation panel.</a:t>
+            </a:r>
+          </a:p>
+        </p:txBody>
+      </p:sp>
+    </p:spTree>
+    <p:extLst>
+      <p:ext uri="{BB962C8B-B14F-4D97-AF65-F5344CB8AC3E}">
+        <p14:creationId xmlns:p14="http://schemas.microsoft.com/office/powerpoint/2010/main" val="3931872639"/>
+      </p:ext>
+    </p:extLst>
+  </p:cSld>
+  <p:clrMapOvr>
+    <a:masterClrMapping/>
+  </p:clrMapOvr>
+</p:sld>
+</file>
+
+<file path=ppt/slides/slide3.xml><?xml version="1.0" encoding="utf-8"?>
+<p:sld xmlns:a="http://schemas.openxmlformats.org/drawingml/2006/main" xmlns:r="http://schemas.openxmlformats.org/officeDocument/2006/relationships" xmlns:p="http://schemas.openxmlformats.org/presentationml/2006/main">
+  <p:cSld>
+    <p:spTree>
+      <p:nvGrpSpPr>
+        <p:cNvPr id="1" name=""/>
+        <p:cNvGrpSpPr/>
+        <p:nvPr/>
+      </p:nvGrpSpPr>
+      <p:grpSpPr>
+        <a:xfrm>
+          <a:off x="0" y="0"/>
+          <a:ext cx="0" cy="0"/>
+          <a:chOff x="0" y="0"/>
+          <a:chExt cx="0" cy="0"/>
+        </a:xfrm>
+      </p:grpSpPr>
+      <p:sp>
+        <p:nvSpPr>
+          <p:cNvPr id="6" name="Rectangle 5">
+            <a:extLst>
+              <a:ext uri="{FF2B5EF4-FFF2-40B4-BE49-F238E27FC236}">
+                <a16:creationId xmlns:a16="http://schemas.microsoft.com/office/drawing/2014/main" id="{972C0003-F76D-488A-81D4-7A96817E3208}"/>
+              </a:ext>
+            </a:extLst>
+          </p:cNvPr>
+          <p:cNvSpPr/>
+          <p:nvPr/>
+        </p:nvSpPr>
+        <p:spPr>
+          <a:xfrm>
+            <a:off x="0" y="0"/>
+            <a:ext cx="12192000" cy="6858000"/>
+          </a:xfrm>
+          <a:prstGeom prst="rect">
+            <a:avLst/>
+          </a:prstGeom>
+          <a:solidFill>
+            <a:schemeClr val="bg1">
+              <a:alpha val="20000"/>
+            </a:schemeClr>
+          </a:solidFill>
+          <a:ln>
+            <a:noFill/>
+          </a:ln>
+        </p:spPr>
+        <p:style>
+          <a:lnRef idx="2">
+            <a:schemeClr val="accent1">
+              <a:shade val="50000"/>
+            </a:schemeClr>
+          </a:lnRef>
+          <a:fillRef idx="1">
+            <a:schemeClr val="accent1"/>
+          </a:fillRef>
+          <a:effectRef idx="0">
+            <a:schemeClr val="accent1"/>
+          </a:effectRef>
+          <a:fontRef idx="minor">
+            <a:schemeClr val="lt1"/>
+          </a:fontRef>
+        </p:style>
+        <p:txBody>
+          <a:bodyPr rtlCol="0" anchor="ctr"/>
+          <a:lstStyle/>
+          <a:p>
+            <a:pPr algn="ctr"/>
+            <a:endParaRPr lang="en-US"/>
+          </a:p>
+        </p:txBody>
+      </p:sp>
+      <p:sp>
+        <p:nvSpPr>
+          <p:cNvPr id="8" name="Callout: Left Arrow 7">
+            <a:extLst>
+              <a:ext uri="{FF2B5EF4-FFF2-40B4-BE49-F238E27FC236}">
+                <a16:creationId xmlns:a16="http://schemas.microsoft.com/office/drawing/2014/main" id="{14D5A37D-C501-471C-A959-544DD95375C6}"/>
+              </a:ext>
+            </a:extLst>
+          </p:cNvPr>
+          <p:cNvSpPr/>
+          <p:nvPr/>
+        </p:nvSpPr>
+        <p:spPr>
+          <a:xfrm>
+            <a:off x="397064" y="119133"/>
+            <a:ext cx="2984790" cy="265318"/>
+          </a:xfrm>
+          <a:prstGeom prst="leftArrowCallout">
+            <a:avLst>
+              <a:gd name="adj1" fmla="val 25000"/>
+              <a:gd name="adj2" fmla="val 25000"/>
+              <a:gd name="adj3" fmla="val 25000"/>
+              <a:gd name="adj4" fmla="val 94133"/>
+            </a:avLst>
+          </a:prstGeom>
+          <a:solidFill>
+            <a:schemeClr val="bg1"/>
+          </a:solidFill>
+          <a:ln>
+            <a:solidFill>
+              <a:schemeClr val="tx1"/>
+            </a:solidFill>
+          </a:ln>
+          <a:effectLst>
+            <a:outerShdw blurRad="50800" dist="38100" dir="2700000" algn="tl" rotWithShape="0">
+              <a:prstClr val="black">
+                <a:alpha val="40000"/>
+              </a:prstClr>
+            </a:outerShdw>
+          </a:effectLst>
+        </p:spPr>
+        <p:style>
+          <a:lnRef idx="2">
+            <a:schemeClr val="accent1">
+              <a:shade val="50000"/>
+            </a:schemeClr>
+          </a:lnRef>
+          <a:fillRef idx="1">
+            <a:schemeClr val="accent1"/>
+          </a:fillRef>
+          <a:effectRef idx="0">
+            <a:schemeClr val="accent1"/>
+          </a:effectRef>
+          <a:fontRef idx="minor">
+            <a:schemeClr val="lt1"/>
+          </a:fontRef>
+        </p:style>
+        <p:txBody>
+          <a:bodyPr rtlCol="0" anchor="ctr"/>
+          <a:lstStyle/>
+          <a:p>
+            <a:pPr algn="ctr"/>
+            <a:r>
+              <a:rPr lang="en-US" sz="1400" dirty="0">
+                <a:solidFill>
+                  <a:schemeClr val="tx1"/>
+                </a:solidFill>
+                <a:latin typeface="Trebuchet MS" panose="020B0603020202020204" pitchFamily="34" charset="0"/>
+              </a:rPr>
+              <a:t>Click here for navigation panel.</a:t>
             </a:r>
           </a:p>
         </p:txBody>
@@ -6837,6 +7275,154 @@
                 <a:latin typeface="Trebuchet MS" panose="020B0603020202020204" pitchFamily="34" charset="0"/>
               </a:rPr>
               <a:t>Click here to open Help pane</a:t>
+            </a:r>
+          </a:p>
+        </p:txBody>
+      </p:sp>
+      <p:sp>
+        <p:nvSpPr>
+          <p:cNvPr id="23" name="Callout: Left Arrow 22">
+            <a:extLst>
+              <a:ext uri="{FF2B5EF4-FFF2-40B4-BE49-F238E27FC236}">
+                <a16:creationId xmlns:a16="http://schemas.microsoft.com/office/drawing/2014/main" id="{A968C119-75C8-4FAC-B226-7F72D93F36F7}"/>
+              </a:ext>
+            </a:extLst>
+          </p:cNvPr>
+          <p:cNvSpPr/>
+          <p:nvPr/>
+        </p:nvSpPr>
+        <p:spPr>
+          <a:xfrm>
+            <a:off x="428368" y="572307"/>
+            <a:ext cx="3203832" cy="265318"/>
+          </a:xfrm>
+          <a:prstGeom prst="leftArrowCallout">
+            <a:avLst>
+              <a:gd name="adj1" fmla="val 25000"/>
+              <a:gd name="adj2" fmla="val 25000"/>
+              <a:gd name="adj3" fmla="val 25000"/>
+              <a:gd name="adj4" fmla="val 94133"/>
+            </a:avLst>
+          </a:prstGeom>
+          <a:solidFill>
+            <a:schemeClr val="bg1"/>
+          </a:solidFill>
+          <a:ln>
+            <a:solidFill>
+              <a:schemeClr val="tx1"/>
+            </a:solidFill>
+          </a:ln>
+          <a:effectLst>
+            <a:outerShdw blurRad="50800" dist="38100" dir="2700000" algn="tl" rotWithShape="0">
+              <a:prstClr val="black">
+                <a:alpha val="40000"/>
+              </a:prstClr>
+            </a:outerShdw>
+          </a:effectLst>
+        </p:spPr>
+        <p:style>
+          <a:lnRef idx="2">
+            <a:schemeClr val="accent1">
+              <a:shade val="50000"/>
+            </a:schemeClr>
+          </a:lnRef>
+          <a:fillRef idx="1">
+            <a:schemeClr val="accent1"/>
+          </a:fillRef>
+          <a:effectRef idx="0">
+            <a:schemeClr val="accent1"/>
+          </a:effectRef>
+          <a:fontRef idx="minor">
+            <a:schemeClr val="lt1"/>
+          </a:fontRef>
+        </p:style>
+        <p:txBody>
+          <a:bodyPr rtlCol="0" anchor="ctr"/>
+          <a:lstStyle/>
+          <a:p>
+            <a:pPr algn="ctr"/>
+            <a:r>
+              <a:rPr lang="en-US" sz="1400" dirty="0">
+                <a:solidFill>
+                  <a:schemeClr val="tx1"/>
+                </a:solidFill>
+                <a:latin typeface="Trebuchet MS" panose="020B0603020202020204" pitchFamily="34" charset="0"/>
+              </a:rPr>
+              <a:t>Click here for more filter options.</a:t>
+            </a:r>
+          </a:p>
+        </p:txBody>
+      </p:sp>
+      <p:sp>
+        <p:nvSpPr>
+          <p:cNvPr id="26" name="Callout: Left Arrow 25">
+            <a:extLst>
+              <a:ext uri="{FF2B5EF4-FFF2-40B4-BE49-F238E27FC236}">
+                <a16:creationId xmlns:a16="http://schemas.microsoft.com/office/drawing/2014/main" id="{C7E02353-95B4-49B0-A06D-23F551B1EB21}"/>
+              </a:ext>
+            </a:extLst>
+          </p:cNvPr>
+          <p:cNvSpPr/>
+          <p:nvPr/>
+        </p:nvSpPr>
+        <p:spPr>
+          <a:xfrm>
+            <a:off x="472418" y="1072209"/>
+            <a:ext cx="3618320" cy="265318"/>
+          </a:xfrm>
+          <a:prstGeom prst="leftArrowCallout">
+            <a:avLst>
+              <a:gd name="adj1" fmla="val 25000"/>
+              <a:gd name="adj2" fmla="val 25000"/>
+              <a:gd name="adj3" fmla="val 25000"/>
+              <a:gd name="adj4" fmla="val 95975"/>
+            </a:avLst>
+          </a:prstGeom>
+          <a:solidFill>
+            <a:schemeClr val="bg1"/>
+          </a:solidFill>
+          <a:ln>
+            <a:solidFill>
+              <a:schemeClr val="tx1"/>
+            </a:solidFill>
+          </a:ln>
+          <a:effectLst>
+            <a:outerShdw blurRad="50800" dist="38100" dir="2700000" algn="tl" rotWithShape="0">
+              <a:prstClr val="black">
+                <a:alpha val="40000"/>
+              </a:prstClr>
+            </a:outerShdw>
+          </a:effectLst>
+        </p:spPr>
+        <p:style>
+          <a:lnRef idx="2">
+            <a:schemeClr val="accent1">
+              <a:shade val="50000"/>
+            </a:schemeClr>
+          </a:lnRef>
+          <a:fillRef idx="1">
+            <a:schemeClr val="accent1"/>
+          </a:fillRef>
+          <a:effectRef idx="0">
+            <a:schemeClr val="accent1"/>
+          </a:effectRef>
+          <a:fontRef idx="minor">
+            <a:schemeClr val="lt1"/>
+          </a:fontRef>
+        </p:style>
+        <p:txBody>
+          <a:bodyPr rtlCol="0" anchor="ctr"/>
+          <a:lstStyle/>
+          <a:p>
+            <a:pPr algn="ctr"/>
+            <a:r>
+              <a:rPr lang="en-US" sz="1400" dirty="0">
+                <a:solidFill>
+                  <a:schemeClr val="tx1"/>
+                </a:solidFill>
+                <a:latin typeface="Trebuchet MS" panose="020B0603020202020204" pitchFamily="34" charset="0"/>
+              </a:rPr>
+              <a:t>Click here to reset all filters from page.</a:t>
             </a:r>
           </a:p>
         </p:txBody>

</xml_diff>